<commit_message>
Improved plot of the sensitivity analysis
</commit_message>
<xml_diff>
--- a/chapter_05/figures/sensitivity_analysis_global_extension.pptx
+++ b/chapter_05/figures/sensitivity_analysis_global_extension.pptx
@@ -112,14 +112,6 @@
 </p:presentation>
 </file>
 
-<file path=ppt/revisionInfo.xml><?xml version="1.0" encoding="utf-8"?>
-<p1510:revInfo xmlns:a="http://schemas.openxmlformats.org/drawingml/2006/main" xmlns:r="http://schemas.openxmlformats.org/officeDocument/2006/relationships" xmlns:p1510="http://schemas.microsoft.com/office/powerpoint/2015/10/main">
-  <p1510:revLst>
-    <p1510:client id="{BCD1AF59-CADB-4DE1-9E55-27A782576C29}" v="12" dt="2024-07-12T09:10:23.907"/>
-  </p1510:revLst>
-</p1510:revInfo>
-</file>
-
 <file path=ppt/changesInfos/changesInfo1.xml><?xml version="1.0" encoding="utf-8"?>
 <pc:chgInfo xmlns:a="http://schemas.openxmlformats.org/drawingml/2006/main" xmlns:r="http://schemas.openxmlformats.org/officeDocument/2006/relationships" xmlns:ac="http://schemas.microsoft.com/office/drawing/2013/main/command" xmlns:pc="http://schemas.microsoft.com/office/powerpoint/2013/main/command">
   <pc:docChgLst>
@@ -3846,6 +3838,30 @@
             <ac:cxnSpMk id="382" creationId="{5DD63CA4-403A-A778-60F7-4CFDE2CDEF7E}"/>
           </ac:cxnSpMkLst>
         </pc:cxnChg>
+      </pc:sldChg>
+    </pc:docChg>
+  </pc:docChgLst>
+  <pc:docChgLst>
+    <pc:chgData name="Fatima Pillosu" userId="a6295d4dc9e22643" providerId="LiveId" clId="{E1643B5C-3653-4C51-A51F-E3F20D8A6D1D}"/>
+    <pc:docChg chg="modSld">
+      <pc:chgData name="Fatima Pillosu" userId="a6295d4dc9e22643" providerId="LiveId" clId="{E1643B5C-3653-4C51-A51F-E3F20D8A6D1D}" dt="2025-05-29T21:42:30.494" v="11" actId="20577"/>
+      <pc:docMkLst>
+        <pc:docMk/>
+      </pc:docMkLst>
+      <pc:sldChg chg="modSp mod">
+        <pc:chgData name="Fatima Pillosu" userId="a6295d4dc9e22643" providerId="LiveId" clId="{E1643B5C-3653-4C51-A51F-E3F20D8A6D1D}" dt="2025-05-29T21:42:30.494" v="11" actId="20577"/>
+        <pc:sldMkLst>
+          <pc:docMk/>
+          <pc:sldMk cId="3388292743" sldId="256"/>
+        </pc:sldMkLst>
+        <pc:spChg chg="mod">
+          <ac:chgData name="Fatima Pillosu" userId="a6295d4dc9e22643" providerId="LiveId" clId="{E1643B5C-3653-4C51-A51F-E3F20D8A6D1D}" dt="2025-05-29T21:42:30.494" v="11" actId="20577"/>
+          <ac:spMkLst>
+            <pc:docMk/>
+            <pc:sldMk cId="3388292743" sldId="256"/>
+            <ac:spMk id="385" creationId="{9C1FDAAE-F7BE-C1EE-8CA9-4AE2410C0809}"/>
+          </ac:spMkLst>
+        </pc:spChg>
       </pc:sldChg>
     </pc:docChg>
   </pc:docChgLst>
@@ -5375,7 +5391,7 @@
           <a:p>
             <a:fld id="{BE90AB92-9B2A-4B8F-852B-2B1D132E881F}" type="datetimeFigureOut">
               <a:rPr lang="en-GB" smtClean="0"/>
-              <a:t>12/07/2024</a:t>
+              <a:t>29/05/2025</a:t>
             </a:fld>
             <a:endParaRPr lang="en-GB"/>
           </a:p>
@@ -5545,7 +5561,7 @@
           <a:p>
             <a:fld id="{BE90AB92-9B2A-4B8F-852B-2B1D132E881F}" type="datetimeFigureOut">
               <a:rPr lang="en-GB" smtClean="0"/>
-              <a:t>12/07/2024</a:t>
+              <a:t>29/05/2025</a:t>
             </a:fld>
             <a:endParaRPr lang="en-GB"/>
           </a:p>
@@ -5725,7 +5741,7 @@
           <a:p>
             <a:fld id="{BE90AB92-9B2A-4B8F-852B-2B1D132E881F}" type="datetimeFigureOut">
               <a:rPr lang="en-GB" smtClean="0"/>
-              <a:t>12/07/2024</a:t>
+              <a:t>29/05/2025</a:t>
             </a:fld>
             <a:endParaRPr lang="en-GB"/>
           </a:p>
@@ -5895,7 +5911,7 @@
           <a:p>
             <a:fld id="{BE90AB92-9B2A-4B8F-852B-2B1D132E881F}" type="datetimeFigureOut">
               <a:rPr lang="en-GB" smtClean="0"/>
-              <a:t>12/07/2024</a:t>
+              <a:t>29/05/2025</a:t>
             </a:fld>
             <a:endParaRPr lang="en-GB"/>
           </a:p>
@@ -6141,7 +6157,7 @@
           <a:p>
             <a:fld id="{BE90AB92-9B2A-4B8F-852B-2B1D132E881F}" type="datetimeFigureOut">
               <a:rPr lang="en-GB" smtClean="0"/>
-              <a:t>12/07/2024</a:t>
+              <a:t>29/05/2025</a:t>
             </a:fld>
             <a:endParaRPr lang="en-GB"/>
           </a:p>
@@ -6373,7 +6389,7 @@
           <a:p>
             <a:fld id="{BE90AB92-9B2A-4B8F-852B-2B1D132E881F}" type="datetimeFigureOut">
               <a:rPr lang="en-GB" smtClean="0"/>
-              <a:t>12/07/2024</a:t>
+              <a:t>29/05/2025</a:t>
             </a:fld>
             <a:endParaRPr lang="en-GB"/>
           </a:p>
@@ -6740,7 +6756,7 @@
           <a:p>
             <a:fld id="{BE90AB92-9B2A-4B8F-852B-2B1D132E881F}" type="datetimeFigureOut">
               <a:rPr lang="en-GB" smtClean="0"/>
-              <a:t>12/07/2024</a:t>
+              <a:t>29/05/2025</a:t>
             </a:fld>
             <a:endParaRPr lang="en-GB"/>
           </a:p>
@@ -6858,7 +6874,7 @@
           <a:p>
             <a:fld id="{BE90AB92-9B2A-4B8F-852B-2B1D132E881F}" type="datetimeFigureOut">
               <a:rPr lang="en-GB" smtClean="0"/>
-              <a:t>12/07/2024</a:t>
+              <a:t>29/05/2025</a:t>
             </a:fld>
             <a:endParaRPr lang="en-GB"/>
           </a:p>
@@ -6953,7 +6969,7 @@
           <a:p>
             <a:fld id="{BE90AB92-9B2A-4B8F-852B-2B1D132E881F}" type="datetimeFigureOut">
               <a:rPr lang="en-GB" smtClean="0"/>
-              <a:t>12/07/2024</a:t>
+              <a:t>29/05/2025</a:t>
             </a:fld>
             <a:endParaRPr lang="en-GB"/>
           </a:p>
@@ -7230,7 +7246,7 @@
           <a:p>
             <a:fld id="{BE90AB92-9B2A-4B8F-852B-2B1D132E881F}" type="datetimeFigureOut">
               <a:rPr lang="en-GB" smtClean="0"/>
-              <a:t>12/07/2024</a:t>
+              <a:t>29/05/2025</a:t>
             </a:fld>
             <a:endParaRPr lang="en-GB"/>
           </a:p>
@@ -7487,7 +7503,7 @@
           <a:p>
             <a:fld id="{BE90AB92-9B2A-4B8F-852B-2B1D132E881F}" type="datetimeFigureOut">
               <a:rPr lang="en-GB" smtClean="0"/>
-              <a:t>12/07/2024</a:t>
+              <a:t>29/05/2025</a:t>
             </a:fld>
             <a:endParaRPr lang="en-GB"/>
           </a:p>
@@ -7700,7 +7716,7 @@
           <a:p>
             <a:fld id="{BE90AB92-9B2A-4B8F-852B-2B1D132E881F}" type="datetimeFigureOut">
               <a:rPr lang="en-GB" smtClean="0"/>
-              <a:t>12/07/2024</a:t>
+              <a:t>29/05/2025</a:t>
             </a:fld>
             <a:endParaRPr lang="en-GB"/>
           </a:p>
@@ -10460,7 +10476,26 @@
                 <a:effectLst/>
                 <a:latin typeface="Aptos" panose="020B0004020202020204" pitchFamily="34" charset="0"/>
               </a:rPr>
-              <a:t>Sensitivity analysis for the global extension of the ANN’s US-focused training</a:t>
+              <a:t>Sensitivity analysis for the global extension of the </a:t>
+            </a:r>
+            <a:r>
+              <a:rPr lang="en-US" sz="800" b="1" dirty="0">
+                <a:solidFill>
+                  <a:srgbClr val="0D0D0D"/>
+                </a:solidFill>
+                <a:latin typeface="Aptos" panose="020B0004020202020204" pitchFamily="34" charset="0"/>
+              </a:rPr>
+              <a:t>XGBoost</a:t>
+            </a:r>
+            <a:r>
+              <a:rPr lang="en-US" sz="800" b="1" i="0" dirty="0">
+                <a:solidFill>
+                  <a:srgbClr val="0D0D0D"/>
+                </a:solidFill>
+                <a:effectLst/>
+                <a:latin typeface="Aptos" panose="020B0004020202020204" pitchFamily="34" charset="0"/>
+              </a:rPr>
+              <a:t>’s US-focused training</a:t>
             </a:r>
           </a:p>
           <a:p>
@@ -10471,7 +10506,16 @@
                 </a:solidFill>
                 <a:latin typeface="Aptos" panose="020B0004020202020204" pitchFamily="34" charset="0"/>
               </a:rPr>
-              <a:t>Verification period (VP): 01-01-2021 to 31-12-2023</a:t>
+              <a:t>Verification period (VP): 01-01-2021 </a:t>
+            </a:r>
+            <a:r>
+              <a:rPr lang="en-US" sz="800">
+                <a:solidFill>
+                  <a:srgbClr val="0D0D0D"/>
+                </a:solidFill>
+                <a:latin typeface="Aptos" panose="020B0004020202020204" pitchFamily="34" charset="0"/>
+              </a:rPr>
+              <a:t>to 31-12-2024</a:t>
             </a:r>
             <a:endParaRPr lang="en-US" sz="800" dirty="0">
               <a:latin typeface="Aptos" panose="020B0004020202020204" pitchFamily="34" charset="0"/>

</xml_diff>